<commit_message>
Revised the title page
Added text to the title page
</commit_message>
<xml_diff>
--- a/[Draft] AWARDS Diary Study_Vetsnet Decomm Sol.pptx
+++ b/[Draft] AWARDS Diary Study_Vetsnet Decomm Sol.pptx
@@ -659,7 +659,7 @@
           <a:p>
             <a:fld id="{1E4EA599-9803-B04C-B3FB-2B0E7F023161}" type="datetimeFigureOut">
               <a:rPr lang="en-US" smtClean="0"/>
-              <a:t>10/16/19</a:t>
+              <a:t>10/18/19</a:t>
             </a:fld>
             <a:endParaRPr lang="en-US"/>
           </a:p>
@@ -824,7 +824,7 @@
           <a:p>
             <a:fld id="{15DFAF83-101F-2B48-87AB-16089F66384F}" type="datetimeFigureOut">
               <a:rPr lang="en-US" smtClean="0"/>
-              <a:t>10/16/19</a:t>
+              <a:t>10/18/19</a:t>
             </a:fld>
             <a:endParaRPr lang="en-US"/>
           </a:p>
@@ -3756,10 +3756,29 @@
         </p:spPr>
         <p:txBody>
           <a:bodyPr>
-            <a:normAutofit/>
+            <a:normAutofit fontScale="90000"/>
           </a:bodyPr>
           <a:lstStyle/>
           <a:p>
+            <a:r>
+              <a:rPr lang="en-US" dirty="0" err="1"/>
+              <a:t>TESTing</a:t>
+            </a:r>
+            <a:r>
+              <a:rPr lang="en-US" dirty="0"/>
+              <a:t> and </a:t>
+            </a:r>
+            <a:r>
+              <a:rPr lang="en-US"/>
+              <a:t>having success</a:t>
+            </a:r>
+            <a:br>
+              <a:rPr lang="en-US"/>
+            </a:br>
+            <a:r>
+              <a:rPr lang="en-US"/>
+              <a:t> - </a:t>
+            </a:r>
             <a:r>
               <a:rPr lang="en-US" dirty="0" err="1"/>
               <a:t>vETSNET</a:t>
@@ -8075,12 +8094,6 @@
 </file>
 
 <file path=customXml/item1.xml><?xml version="1.0" encoding="utf-8"?>
-<p:properties xmlns:p="http://schemas.microsoft.com/office/2006/metadata/properties" xmlns:xsi="http://www.w3.org/2001/XMLSchema-instance" xmlns:pc="http://schemas.microsoft.com/office/infopath/2007/PartnerControls">
-  <documentManagement/>
-</p:properties>
-</file>
-
-<file path=customXml/item2.xml><?xml version="1.0" encoding="utf-8"?>
 <ct:contentTypeSchema xmlns:ct="http://schemas.microsoft.com/office/2006/metadata/contentType" xmlns:ma="http://schemas.microsoft.com/office/2006/metadata/properties/metaAttributes" ct:_="" ma:_="" ma:contentTypeName="Document" ma:contentTypeID="0x01010042E55B6CD4FED444AB9E5ED416F3DE32" ma:contentTypeVersion="" ma:contentTypeDescription="Create a new document." ma:contentTypeScope="" ma:versionID="ff2816b4d7ae925532c4cddf65b20ea9">
   <xsd:schema xmlns:xsd="http://www.w3.org/2001/XMLSchema" xmlns:xs="http://www.w3.org/2001/XMLSchema" xmlns:p="http://schemas.microsoft.com/office/2006/metadata/properties" xmlns:ns2="b2471924-5046-4d82-88c5-44c00ce32f11" xmlns:ns3="d2a671d4-d177-4781-ba99-e6402ffd2b6f" xmlns:ns4="c0dc7ddb-a34e-4ac9-b9fa-6478c9b805dd" targetNamespace="http://schemas.microsoft.com/office/2006/metadata/properties" ma:root="true" ma:fieldsID="a3c390fa37e70180bbcb266d4a66a9ed" ns2:_="" ns3:_="" ns4:_="">
     <xsd:import namespace="b2471924-5046-4d82-88c5-44c00ce32f11"/>
@@ -8276,7 +8289,7 @@
 </ct:contentTypeSchema>
 </file>
 
-<file path=customXml/item3.xml><?xml version="1.0" encoding="utf-8"?>
+<file path=customXml/item2.xml><?xml version="1.0" encoding="utf-8"?>
 <?mso-contentType ?>
 <FormTemplates xmlns="http://schemas.microsoft.com/sharepoint/v3/contenttype/forms">
   <Display>DocumentLibraryForm</Display>
@@ -8285,25 +8298,13 @@
 </FormTemplates>
 </file>
 
-<file path=customXml/itemProps1.xml><?xml version="1.0" encoding="utf-8"?>
-<ds:datastoreItem xmlns:ds="http://schemas.openxmlformats.org/officeDocument/2006/customXml" ds:itemID="{F716FE7B-D01A-4615-B63D-10F52FA5841D}">
-  <ds:schemaRefs>
-    <ds:schemaRef ds:uri="http://schemas.microsoft.com/office/2006/metadata/properties"/>
-    <ds:schemaRef ds:uri="b2471924-5046-4d82-88c5-44c00ce32f11"/>
-    <ds:schemaRef ds:uri="http://www.w3.org/XML/1998/namespace"/>
-    <ds:schemaRef ds:uri="http://purl.org/dc/terms/"/>
-    <ds:schemaRef ds:uri="http://schemas.microsoft.com/office/infopath/2007/PartnerControls"/>
-    <ds:schemaRef ds:uri="http://purl.org/dc/elements/1.1/"/>
-    <ds:schemaRef ds:uri="http://schemas.microsoft.com/office/2006/documentManagement/types"/>
-    <ds:schemaRef ds:uri="http://schemas.openxmlformats.org/package/2006/metadata/core-properties"/>
-    <ds:schemaRef ds:uri="c0dc7ddb-a34e-4ac9-b9fa-6478c9b805dd"/>
-    <ds:schemaRef ds:uri="d2a671d4-d177-4781-ba99-e6402ffd2b6f"/>
-    <ds:schemaRef ds:uri="http://purl.org/dc/dcmitype/"/>
-  </ds:schemaRefs>
-</ds:datastoreItem>
+<file path=customXml/item3.xml><?xml version="1.0" encoding="utf-8"?>
+<p:properties xmlns:p="http://schemas.microsoft.com/office/2006/metadata/properties" xmlns:xsi="http://www.w3.org/2001/XMLSchema-instance" xmlns:pc="http://schemas.microsoft.com/office/infopath/2007/PartnerControls">
+  <documentManagement/>
+</p:properties>
 </file>
 
-<file path=customXml/itemProps2.xml><?xml version="1.0" encoding="utf-8"?>
+<file path=customXml/itemProps1.xml><?xml version="1.0" encoding="utf-8"?>
 <ds:datastoreItem xmlns:ds="http://schemas.openxmlformats.org/officeDocument/2006/customXml" ds:itemID="{32A509FE-5002-48B7-9EA0-86D179AC586F}">
   <ds:schemaRefs>
     <ds:schemaRef ds:uri="http://schemas.microsoft.com/office/2006/metadata/contentType"/>
@@ -8323,10 +8324,28 @@
 </ds:datastoreItem>
 </file>
 
-<file path=customXml/itemProps3.xml><?xml version="1.0" encoding="utf-8"?>
+<file path=customXml/itemProps2.xml><?xml version="1.0" encoding="utf-8"?>
 <ds:datastoreItem xmlns:ds="http://schemas.openxmlformats.org/officeDocument/2006/customXml" ds:itemID="{B7405FF9-5544-4FF9-B730-FAFB856BE31A}">
   <ds:schemaRefs>
     <ds:schemaRef ds:uri="http://schemas.microsoft.com/sharepoint/v3/contenttype/forms"/>
   </ds:schemaRefs>
 </ds:datastoreItem>
+</file>
+
+<file path=customXml/itemProps3.xml><?xml version="1.0" encoding="utf-8"?>
+<ds:datastoreItem xmlns:ds="http://schemas.openxmlformats.org/officeDocument/2006/customXml" ds:itemID="{F716FE7B-D01A-4615-B63D-10F52FA5841D}">
+  <ds:schemaRefs>
+    <ds:schemaRef ds:uri="http://schemas.microsoft.com/office/2006/metadata/properties"/>
+    <ds:schemaRef ds:uri="b2471924-5046-4d82-88c5-44c00ce32f11"/>
+    <ds:schemaRef ds:uri="http://www.w3.org/XML/1998/namespace"/>
+    <ds:schemaRef ds:uri="http://purl.org/dc/terms/"/>
+    <ds:schemaRef ds:uri="http://schemas.microsoft.com/office/infopath/2007/PartnerControls"/>
+    <ds:schemaRef ds:uri="http://purl.org/dc/elements/1.1/"/>
+    <ds:schemaRef ds:uri="http://schemas.microsoft.com/office/2006/documentManagement/types"/>
+    <ds:schemaRef ds:uri="http://schemas.openxmlformats.org/package/2006/metadata/core-properties"/>
+    <ds:schemaRef ds:uri="c0dc7ddb-a34e-4ac9-b9fa-6478c9b805dd"/>
+    <ds:schemaRef ds:uri="d2a671d4-d177-4781-ba99-e6402ffd2b6f"/>
+    <ds:schemaRef ds:uri="http://purl.org/dc/dcmitype/"/>
+  </ds:schemaRefs>
+</ds:datastoreItem>
 </file>
</xml_diff>